<commit_message>
map and tower marker
map marker
1125 progress modify
</commit_message>
<xml_diff>
--- a/Progress/2015-11-25_Progress_Report.pptx
+++ b/Progress/2015-11-25_Progress_Report.pptx
@@ -215,7 +215,7 @@
             <a:fld id="{F7BD641D-9A9D-4171-B60C-77A966F66B4B}" type="datetimeFigureOut">
               <a:rPr lang="en-US" smtClean="0"/>
               <a:pPr/>
-              <a:t>11/23/2015</a:t>
+              <a:t>11/24/2015</a:t>
             </a:fld>
             <a:endParaRPr lang="en-US" dirty="0"/>
           </a:p>
@@ -983,7 +983,8 @@
             <a:noAutofit/>
           </a:bodyPr>
           <a:lstStyle>
-            <a:lvl1pPr>
+            <a:lvl1pPr marL="438912" indent="-320040">
+              <a:buNone/>
               <a:defRPr lang="en-US" dirty="0">
                 <a:solidFill>
                   <a:srgbClr val="FFC000"/>
@@ -994,10 +995,7 @@
             </a:lvl1pPr>
           </a:lstStyle>
           <a:p>
-            <a:pPr marL="118872" lvl="0" indent="0">
-              <a:buFontTx/>
-              <a:buNone/>
-            </a:pPr>
+            <a:pPr marL="118872" lvl="0" indent="0"/>
             <a:endParaRPr lang="en-US" dirty="0">
               <a:solidFill>
                 <a:srgbClr val="FFC000"/>
@@ -1059,7 +1057,7 @@
           <a:p>
             <a:fld id="{1F862712-0EAA-4B24-9EC7-9E36D5775037}" type="datetime1">
               <a:rPr lang="en-US" altLang="zh-TW" smtClean="0"/>
-              <a:t>11/23/2015</a:t>
+              <a:t>11/24/2015</a:t>
             </a:fld>
             <a:endParaRPr lang="en-US" dirty="0"/>
           </a:p>
@@ -1236,7 +1234,7 @@
           <a:p>
             <a:fld id="{3CEF2791-2FDD-494D-BB6B-5C6E4D786EF9}" type="datetime1">
               <a:rPr lang="en-US" altLang="zh-TW" smtClean="0"/>
-              <a:t>11/23/2015</a:t>
+              <a:t>11/24/2015</a:t>
             </a:fld>
             <a:endParaRPr lang="en-US" dirty="0"/>
           </a:p>
@@ -1524,7 +1522,7 @@
           <a:p>
             <a:fld id="{C60EF7C1-B2BF-4087-B979-9ED821F5CB27}" type="datetime1">
               <a:rPr lang="en-US" altLang="zh-TW" smtClean="0"/>
-              <a:t>11/23/2015</a:t>
+              <a:t>11/24/2015</a:t>
             </a:fld>
             <a:endParaRPr lang="en-US" dirty="0"/>
           </a:p>
@@ -1711,7 +1709,7 @@
           <a:p>
             <a:fld id="{5BBCF648-D6A8-4616-837F-92321703E524}" type="datetime1">
               <a:rPr lang="en-US" altLang="zh-TW" smtClean="0"/>
-              <a:t>11/23/2015</a:t>
+              <a:t>11/24/2015</a:t>
             </a:fld>
             <a:endParaRPr lang="en-US" dirty="0"/>
           </a:p>
@@ -2072,7 +2070,7 @@
           <a:p>
             <a:fld id="{BC82D0EC-25CF-4E16-A20A-DCD5AFD12D04}" type="datetime1">
               <a:rPr lang="en-US" altLang="zh-TW" smtClean="0"/>
-              <a:t>11/23/2015</a:t>
+              <a:t>11/24/2015</a:t>
             </a:fld>
             <a:endParaRPr lang="en-US" dirty="0"/>
           </a:p>
@@ -2367,7 +2365,7 @@
           <a:p>
             <a:fld id="{9DE839BD-CC3A-456C-80D9-436965355135}" type="datetime1">
               <a:rPr lang="en-US" altLang="zh-TW" smtClean="0"/>
-              <a:t>11/23/2015</a:t>
+              <a:t>11/24/2015</a:t>
             </a:fld>
             <a:endParaRPr lang="en-US" dirty="0"/>
           </a:p>
@@ -2797,7 +2795,7 @@
           <a:p>
             <a:fld id="{56637976-EA0B-4C00-A409-14178D2C586A}" type="datetime1">
               <a:rPr lang="en-US" altLang="zh-TW" smtClean="0"/>
-              <a:t>11/23/2015</a:t>
+              <a:t>11/24/2015</a:t>
             </a:fld>
             <a:endParaRPr lang="en-US" dirty="0"/>
           </a:p>
@@ -2913,7 +2911,7 @@
           <a:p>
             <a:fld id="{E6B3C412-4571-4EFA-8A74-F6353CBDA582}" type="datetime1">
               <a:rPr lang="en-US" altLang="zh-TW" smtClean="0"/>
-              <a:t>11/23/2015</a:t>
+              <a:t>11/24/2015</a:t>
             </a:fld>
             <a:endParaRPr lang="en-US" dirty="0"/>
           </a:p>
@@ -3011,7 +3009,7 @@
           <a:p>
             <a:fld id="{5A859648-26E5-44B2-88EE-281EB784213A}" type="datetime1">
               <a:rPr lang="en-US" altLang="zh-TW" smtClean="0"/>
-              <a:t>11/23/2015</a:t>
+              <a:t>11/24/2015</a:t>
             </a:fld>
             <a:endParaRPr lang="en-US" dirty="0"/>
           </a:p>
@@ -3297,7 +3295,7 @@
           <a:p>
             <a:fld id="{B12D5D9A-AE13-4A6C-B6D6-202CC90B0F65}" type="datetime1">
               <a:rPr lang="en-US" altLang="zh-TW" smtClean="0"/>
-              <a:t>11/23/2015</a:t>
+              <a:t>11/24/2015</a:t>
             </a:fld>
             <a:endParaRPr lang="en-US" dirty="0"/>
           </a:p>
@@ -3666,7 +3664,7 @@
           <a:p>
             <a:fld id="{72E81E13-8CAF-4834-BDBC-B76C96F69918}" type="datetime1">
               <a:rPr lang="en-US" altLang="zh-TW" smtClean="0"/>
-              <a:t>11/23/2015</a:t>
+              <a:t>11/24/2015</a:t>
             </a:fld>
             <a:endParaRPr lang="en-US" dirty="0"/>
           </a:p>
@@ -4051,11 +4049,7 @@
             <a:pPr lvl="0" eaLnBrk="1" latinLnBrk="0" hangingPunct="1"/>
             <a:r>
               <a:rPr kumimoji="0" lang="zh-TW" altLang="en-US" dirty="0" smtClean="0"/>
-              <a:t>按一下以編輯母片文字</a:t>
-            </a:r>
-            <a:r>
-              <a:rPr kumimoji="0" lang="zh-TW" altLang="en-US" dirty="0" smtClean="0"/>
-              <a:t>樣式</a:t>
+              <a:t>按一下以編輯母片文字樣式</a:t>
             </a:r>
             <a:r>
               <a:rPr kumimoji="0" lang="en-US" altLang="zh-TW" dirty="0" smtClean="0"/>
@@ -4130,7 +4124,7 @@
           <a:p>
             <a:fld id="{1F862712-0EAA-4B24-9EC7-9E36D5775037}" type="datetime1">
               <a:rPr lang="en-US" altLang="zh-TW" smtClean="0"/>
-              <a:t>11/23/2015</a:t>
+              <a:t>11/24/2015</a:t>
             </a:fld>
             <a:endParaRPr lang="en-US" dirty="0"/>
           </a:p>
@@ -4264,9 +4258,15 @@
     </p:titleStyle>
     <p:bodyStyle>
       <a:lvl1pPr marL="438912" indent="-320040" algn="l" rtl="0" eaLnBrk="1" latinLnBrk="0" hangingPunct="1">
+        <a:lnSpc>
+          <a:spcPct val="100000"/>
+        </a:lnSpc>
         <a:spcBef>
           <a:spcPts val="0"/>
         </a:spcBef>
+        <a:spcAft>
+          <a:spcPts val="600"/>
+        </a:spcAft>
         <a:buClr>
           <a:schemeClr val="accent1"/>
         </a:buClr>
@@ -4283,9 +4283,15 @@
         </a:defRPr>
       </a:lvl1pPr>
       <a:lvl2pPr marL="731520" indent="-274320" algn="l" rtl="0" eaLnBrk="1" latinLnBrk="0" hangingPunct="1">
+        <a:lnSpc>
+          <a:spcPct val="100000"/>
+        </a:lnSpc>
         <a:spcBef>
-          <a:spcPct val="20000"/>
+          <a:spcPts val="0"/>
         </a:spcBef>
+        <a:spcAft>
+          <a:spcPts val="600"/>
+        </a:spcAft>
         <a:buClr>
           <a:schemeClr val="accent2"/>
         </a:buClr>
@@ -4302,9 +4308,15 @@
         </a:defRPr>
       </a:lvl2pPr>
       <a:lvl3pPr marL="996696" indent="-228600" algn="l" rtl="0" eaLnBrk="1" latinLnBrk="0" hangingPunct="1">
+        <a:lnSpc>
+          <a:spcPct val="100000"/>
+        </a:lnSpc>
         <a:spcBef>
-          <a:spcPct val="20000"/>
+          <a:spcPts val="0"/>
         </a:spcBef>
+        <a:spcAft>
+          <a:spcPts val="600"/>
+        </a:spcAft>
         <a:buClr>
           <a:schemeClr val="accent3"/>
         </a:buClr>
@@ -4320,9 +4332,15 @@
         </a:defRPr>
       </a:lvl3pPr>
       <a:lvl4pPr marL="1216152" indent="-182880" algn="l" rtl="0" eaLnBrk="1" latinLnBrk="0" hangingPunct="1">
+        <a:lnSpc>
+          <a:spcPct val="100000"/>
+        </a:lnSpc>
         <a:spcBef>
-          <a:spcPct val="20000"/>
+          <a:spcPts val="0"/>
         </a:spcBef>
+        <a:spcAft>
+          <a:spcPts val="600"/>
+        </a:spcAft>
         <a:buClr>
           <a:schemeClr val="accent4"/>
         </a:buClr>
@@ -4338,9 +4356,15 @@
         </a:defRPr>
       </a:lvl4pPr>
       <a:lvl5pPr marL="1426464" indent="-182880" algn="l" rtl="0" eaLnBrk="1" latinLnBrk="0" hangingPunct="1">
+        <a:lnSpc>
+          <a:spcPct val="100000"/>
+        </a:lnSpc>
         <a:spcBef>
-          <a:spcPct val="20000"/>
+          <a:spcPts val="0"/>
         </a:spcBef>
+        <a:spcAft>
+          <a:spcPts val="600"/>
+        </a:spcAft>
         <a:buClr>
           <a:schemeClr val="accent5"/>
         </a:buClr>
@@ -4725,7 +4749,7 @@
       </p:cxnSp>
       <p:sp>
         <p:nvSpPr>
-          <p:cNvPr id="12" name="副標題 11"/>
+          <p:cNvPr id="4" name="副標題 3"/>
           <p:cNvSpPr>
             <a:spLocks noGrp="1"/>
           </p:cNvSpPr>
@@ -4738,9 +4762,6 @@
           <a:bodyPr/>
           <a:lstStyle/>
           <a:p>
-            <a:pPr marL="118872" indent="0">
-              <a:buNone/>
-            </a:pPr>
             <a:endParaRPr lang="zh-TW" altLang="en-US" dirty="0"/>
           </a:p>
         </p:txBody>
@@ -4761,15 +4782,15 @@
           <a:lstStyle/>
           <a:p>
             <a:r>
-              <a:rPr lang="en-US" smtClean="0"/>
+              <a:rPr lang="en-US" dirty="0" smtClean="0"/>
               <a:t>11/</a:t>
             </a:r>
             <a:r>
-              <a:rPr lang="en-US" altLang="zh-TW" smtClean="0"/>
+              <a:rPr lang="en-US" altLang="zh-TW" dirty="0" smtClean="0"/>
               <a:t>25</a:t>
             </a:r>
             <a:r>
-              <a:rPr lang="en-US" smtClean="0"/>
+              <a:rPr lang="en-US" dirty="0" smtClean="0"/>
               <a:t> Progress Report</a:t>
             </a:r>
             <a:endParaRPr lang="en-US" dirty="0"/>
@@ -5061,7 +5082,18 @@
           <a:p>
             <a:r>
               <a:rPr lang="zh-TW" altLang="en-US" dirty="0" smtClean="0"/>
-              <a:t>地圖相對位置辨識</a:t>
+              <a:t>遊戲雛形</a:t>
+            </a:r>
+            <a:endParaRPr lang="en-US" altLang="zh-TW" dirty="0" smtClean="0"/>
+          </a:p>
+          <a:p>
+            <a:r>
+              <a:rPr lang="zh-TW" altLang="en-US" dirty="0" smtClean="0"/>
+              <a:t>地圖</a:t>
+            </a:r>
+            <a:r>
+              <a:rPr lang="zh-TW" altLang="en-US" dirty="0" smtClean="0"/>
+              <a:t>相對位置辨識</a:t>
             </a:r>
             <a:endParaRPr lang="en-US" altLang="zh-TW" dirty="0" smtClean="0"/>
           </a:p>
@@ -5191,7 +5223,7 @@
           <a:bodyPr/>
           <a:lstStyle/>
           <a:p>
-            <a:endParaRPr lang="zh-TW" altLang="en-US"/>
+            <a:endParaRPr lang="zh-TW" altLang="en-US" dirty="0"/>
           </a:p>
         </p:txBody>
       </p:sp>

</xml_diff>